<commit_message>
Brady forgot resource slide so added it
</commit_message>
<xml_diff>
--- a/docs/Tool Co-op Slideshow.pptx
+++ b/docs/Tool Co-op Slideshow.pptx
@@ -26,23 +26,25 @@
     <p:sldId id="271" r:id="rId21"/>
     <p:sldId id="272" r:id="rId22"/>
     <p:sldId id="273" r:id="rId23"/>
+    <p:sldId id="274" r:id="rId24"/>
+    <p:sldId id="275" r:id="rId25"/>
   </p:sldIdLst>
   <p:sldSz cy="5143500" cx="9144000"/>
   <p:notesSz cx="6858000" cy="9144000"/>
   <p:embeddedFontLst>
     <p:embeddedFont>
       <p:font typeface="Raleway"/>
-      <p:regular r:id="rId24"/>
-      <p:bold r:id="rId25"/>
-      <p:italic r:id="rId26"/>
-      <p:boldItalic r:id="rId27"/>
+      <p:regular r:id="rId26"/>
+      <p:bold r:id="rId27"/>
+      <p:italic r:id="rId28"/>
+      <p:boldItalic r:id="rId29"/>
     </p:embeddedFont>
     <p:embeddedFont>
       <p:font typeface="Lato"/>
-      <p:regular r:id="rId28"/>
-      <p:bold r:id="rId29"/>
-      <p:italic r:id="rId30"/>
-      <p:boldItalic r:id="rId31"/>
+      <p:regular r:id="rId30"/>
+      <p:bold r:id="rId31"/>
+      <p:italic r:id="rId32"/>
+      <p:boldItalic r:id="rId33"/>
     </p:embeddedFont>
   </p:embeddedFontLst>
   <p:defaultTextStyle>
@@ -837,7 +839,7 @@
       </p:grpSpPr>
       <p:sp>
         <p:nvSpPr>
-          <p:cNvPr id="138" name="Google Shape;138;g83316f0633_0_87:notes"/>
+          <p:cNvPr id="138" name="Google Shape;138;g83316f0633_0_82:notes"/>
           <p:cNvSpPr/>
           <p:nvPr>
             <p:ph idx="2" type="sldImg"/>
@@ -872,7 +874,7 @@
       </p:sp>
       <p:sp>
         <p:nvSpPr>
-          <p:cNvPr id="139" name="Google Shape;139;g83316f0633_0_87:notes"/>
+          <p:cNvPr id="139" name="Google Shape;139;g83316f0633_0_82:notes"/>
           <p:cNvSpPr txBox="1"/>
           <p:nvPr>
             <p:ph idx="1" type="body"/>
@@ -936,7 +938,7 @@
       </p:grpSpPr>
       <p:sp>
         <p:nvSpPr>
-          <p:cNvPr id="144" name="Google Shape;144;g83316f0633_0_92:notes"/>
+          <p:cNvPr id="144" name="Google Shape;144;g83316f0633_0_87:notes"/>
           <p:cNvSpPr/>
           <p:nvPr>
             <p:ph idx="2" type="sldImg"/>
@@ -971,7 +973,7 @@
       </p:sp>
       <p:sp>
         <p:nvSpPr>
-          <p:cNvPr id="145" name="Google Shape;145;g83316f0633_0_92:notes"/>
+          <p:cNvPr id="145" name="Google Shape;145;g83316f0633_0_87:notes"/>
           <p:cNvSpPr txBox="1"/>
           <p:nvPr>
             <p:ph idx="1" type="body"/>
@@ -1035,7 +1037,7 @@
       </p:grpSpPr>
       <p:sp>
         <p:nvSpPr>
-          <p:cNvPr id="150" name="Google Shape;150;g83375b20b9_5_0:notes"/>
+          <p:cNvPr id="150" name="Google Shape;150;g83316f0633_0_92:notes"/>
           <p:cNvSpPr/>
           <p:nvPr>
             <p:ph idx="2" type="sldImg"/>
@@ -1070,7 +1072,7 @@
       </p:sp>
       <p:sp>
         <p:nvSpPr>
-          <p:cNvPr id="151" name="Google Shape;151;g83375b20b9_5_0:notes"/>
+          <p:cNvPr id="151" name="Google Shape;151;g83316f0633_0_92:notes"/>
           <p:cNvSpPr txBox="1"/>
           <p:nvPr>
             <p:ph idx="1" type="body"/>
@@ -1134,7 +1136,7 @@
       </p:grpSpPr>
       <p:sp>
         <p:nvSpPr>
-          <p:cNvPr id="156" name="Google Shape;156;g83375b20b9_5_5:notes"/>
+          <p:cNvPr id="156" name="Google Shape;156;g83375b20b9_5_0:notes"/>
           <p:cNvSpPr/>
           <p:nvPr>
             <p:ph idx="2" type="sldImg"/>
@@ -1169,7 +1171,7 @@
       </p:sp>
       <p:sp>
         <p:nvSpPr>
-          <p:cNvPr id="157" name="Google Shape;157;g83375b20b9_5_5:notes"/>
+          <p:cNvPr id="157" name="Google Shape;157;g83375b20b9_5_0:notes"/>
           <p:cNvSpPr txBox="1"/>
           <p:nvPr>
             <p:ph idx="1" type="body"/>
@@ -1233,7 +1235,7 @@
       </p:grpSpPr>
       <p:sp>
         <p:nvSpPr>
-          <p:cNvPr id="162" name="Google Shape;162;g83375b20b9_5_10:notes"/>
+          <p:cNvPr id="162" name="Google Shape;162;g83375b20b9_5_5:notes"/>
           <p:cNvSpPr/>
           <p:nvPr>
             <p:ph idx="2" type="sldImg"/>
@@ -1268,7 +1270,7 @@
       </p:sp>
       <p:sp>
         <p:nvSpPr>
-          <p:cNvPr id="163" name="Google Shape;163;g83375b20b9_5_10:notes"/>
+          <p:cNvPr id="163" name="Google Shape;163;g83375b20b9_5_5:notes"/>
           <p:cNvSpPr txBox="1"/>
           <p:nvPr>
             <p:ph idx="1" type="body"/>
@@ -1332,7 +1334,7 @@
       </p:grpSpPr>
       <p:sp>
         <p:nvSpPr>
-          <p:cNvPr id="168" name="Google Shape;168;g833bf2c27a_0_0:notes"/>
+          <p:cNvPr id="168" name="Google Shape;168;g83375b20b9_5_10:notes"/>
           <p:cNvSpPr/>
           <p:nvPr>
             <p:ph idx="2" type="sldImg"/>
@@ -1367,7 +1369,7 @@
       </p:sp>
       <p:sp>
         <p:nvSpPr>
-          <p:cNvPr id="169" name="Google Shape;169;g833bf2c27a_0_0:notes"/>
+          <p:cNvPr id="169" name="Google Shape;169;g83375b20b9_5_10:notes"/>
           <p:cNvSpPr txBox="1"/>
           <p:nvPr>
             <p:ph idx="1" type="body"/>
@@ -1431,7 +1433,7 @@
       </p:grpSpPr>
       <p:sp>
         <p:nvSpPr>
-          <p:cNvPr id="174" name="Google Shape;174;g833bf2c27a_0_5:notes"/>
+          <p:cNvPr id="174" name="Google Shape;174;g833bf2c27a_0_0:notes"/>
           <p:cNvSpPr/>
           <p:nvPr>
             <p:ph idx="2" type="sldImg"/>
@@ -1466,7 +1468,7 @@
       </p:sp>
       <p:sp>
         <p:nvSpPr>
-          <p:cNvPr id="175" name="Google Shape;175;g833bf2c27a_0_5:notes"/>
+          <p:cNvPr id="175" name="Google Shape;175;g833bf2c27a_0_0:notes"/>
           <p:cNvSpPr txBox="1"/>
           <p:nvPr>
             <p:ph idx="1" type="body"/>
@@ -1530,7 +1532,7 @@
       </p:grpSpPr>
       <p:sp>
         <p:nvSpPr>
-          <p:cNvPr id="180" name="Google Shape;180;g833bf2c27a_0_10:notes"/>
+          <p:cNvPr id="180" name="Google Shape;180;g833bf2c27a_0_5:notes"/>
           <p:cNvSpPr/>
           <p:nvPr>
             <p:ph idx="2" type="sldImg"/>
@@ -1565,7 +1567,7 @@
       </p:sp>
       <p:sp>
         <p:nvSpPr>
-          <p:cNvPr id="181" name="Google Shape;181;g833bf2c27a_0_10:notes"/>
+          <p:cNvPr id="181" name="Google Shape;181;g833bf2c27a_0_5:notes"/>
           <p:cNvSpPr txBox="1"/>
           <p:nvPr>
             <p:ph idx="1" type="body"/>
@@ -1629,7 +1631,7 @@
       </p:grpSpPr>
       <p:sp>
         <p:nvSpPr>
-          <p:cNvPr id="186" name="Google Shape;186;g83404ddeb8_0_0:notes"/>
+          <p:cNvPr id="186" name="Google Shape;186;g833bf2c27a_0_10:notes"/>
           <p:cNvSpPr/>
           <p:nvPr>
             <p:ph idx="2" type="sldImg"/>
@@ -1664,7 +1666,106 @@
       </p:sp>
       <p:sp>
         <p:nvSpPr>
-          <p:cNvPr id="187" name="Google Shape;187;g83404ddeb8_0_0:notes"/>
+          <p:cNvPr id="187" name="Google Shape;187;g833bf2c27a_0_10:notes"/>
+          <p:cNvSpPr txBox="1"/>
+          <p:nvPr>
+            <p:ph idx="1" type="body"/>
+          </p:nvPr>
+        </p:nvSpPr>
+        <p:spPr>
+          <a:xfrm>
+            <a:off x="685800" y="4343400"/>
+            <a:ext cx="5486400" cy="4114800"/>
+          </a:xfrm>
+          <a:prstGeom prst="rect">
+            <a:avLst/>
+          </a:prstGeom>
+        </p:spPr>
+        <p:txBody>
+          <a:bodyPr anchorCtr="0" anchor="t" bIns="91425" lIns="91425" spcFirstLastPara="1" rIns="91425" wrap="square" tIns="91425">
+            <a:noAutofit/>
+          </a:bodyPr>
+          <a:lstStyle/>
+          <a:p>
+            <a:pPr indent="0" lvl="0" marL="0" rtl="0" algn="l">
+              <a:spcBef>
+                <a:spcPts val="0"/>
+              </a:spcBef>
+              <a:spcAft>
+                <a:spcPts val="0"/>
+              </a:spcAft>
+              <a:buNone/>
+            </a:pPr>
+            <a:r>
+              <a:t/>
+            </a:r>
+            <a:endParaRPr/>
+          </a:p>
+        </p:txBody>
+      </p:sp>
+    </p:spTree>
+  </p:cSld>
+  <p:clrMapOvr>
+    <a:masterClrMapping/>
+  </p:clrMapOvr>
+</p:notes>
+</file>
+
+<file path=ppt/notesSlides/notesSlide19.xml><?xml version="1.0" encoding="utf-8"?>
+<p:notes xmlns:a="http://schemas.openxmlformats.org/drawingml/2006/main" xmlns:r="http://schemas.openxmlformats.org/officeDocument/2006/relationships" xmlns:mc="http://schemas.openxmlformats.org/markup-compatibility/2006" xmlns:mv="urn:schemas-microsoft-com:mac:vml" xmlns:p="http://schemas.openxmlformats.org/presentationml/2006/main" xmlns:c="http://schemas.openxmlformats.org/drawingml/2006/chart" xmlns:dgm="http://schemas.openxmlformats.org/drawingml/2006/diagram" xmlns:o="urn:schemas-microsoft-com:office:office" xmlns:v="urn:schemas-microsoft-com:vml" xmlns:pvml="urn:schemas-microsoft-com:office:powerpoint" xmlns:com="http://schemas.openxmlformats.org/drawingml/2006/compatibility" xmlns:p14="http://schemas.microsoft.com/office/powerpoint/2010/main" xmlns:p15="http://schemas.microsoft.com/office/powerpoint/2012/main" showMasterPhAnim="0" showMasterSp="0">
+  <p:cSld>
+    <p:spTree>
+      <p:nvGrpSpPr>
+        <p:cNvPr id="191" name="Shape 191"/>
+        <p:cNvGrpSpPr/>
+        <p:nvPr/>
+      </p:nvGrpSpPr>
+      <p:grpSpPr>
+        <a:xfrm>
+          <a:off x="0" y="0"/>
+          <a:ext cx="0" cy="0"/>
+          <a:chOff x="0" y="0"/>
+          <a:chExt cx="0" cy="0"/>
+        </a:xfrm>
+      </p:grpSpPr>
+      <p:sp>
+        <p:nvSpPr>
+          <p:cNvPr id="192" name="Google Shape;192;g83404ddeb8_0_0:notes"/>
+          <p:cNvSpPr/>
+          <p:nvPr>
+            <p:ph idx="2" type="sldImg"/>
+          </p:nvPr>
+        </p:nvSpPr>
+        <p:spPr>
+          <a:xfrm>
+            <a:off x="381300" y="685800"/>
+            <a:ext cx="6096000" cy="3429000"/>
+          </a:xfrm>
+          <a:custGeom>
+            <a:rect b="b" l="l" r="r" t="t"/>
+            <a:pathLst>
+              <a:path extrusionOk="0" h="120000" w="120000">
+                <a:moveTo>
+                  <a:pt x="0" y="0"/>
+                </a:moveTo>
+                <a:lnTo>
+                  <a:pt x="120000" y="0"/>
+                </a:lnTo>
+                <a:lnTo>
+                  <a:pt x="120000" y="120000"/>
+                </a:lnTo>
+                <a:lnTo>
+                  <a:pt x="0" y="120000"/>
+                </a:lnTo>
+                <a:close/>
+              </a:path>
+            </a:pathLst>
+          </a:custGeom>
+        </p:spPr>
+      </p:sp>
+      <p:sp>
+        <p:nvSpPr>
+          <p:cNvPr id="193" name="Google Shape;193;g83404ddeb8_0_0:notes"/>
           <p:cNvSpPr txBox="1"/>
           <p:nvPr>
             <p:ph idx="1" type="body"/>
@@ -1808,6 +1909,105 @@
 </p:notes>
 </file>
 
+<file path=ppt/notesSlides/notesSlide20.xml><?xml version="1.0" encoding="utf-8"?>
+<p:notes xmlns:a="http://schemas.openxmlformats.org/drawingml/2006/main" xmlns:r="http://schemas.openxmlformats.org/officeDocument/2006/relationships" xmlns:mc="http://schemas.openxmlformats.org/markup-compatibility/2006" xmlns:mv="urn:schemas-microsoft-com:mac:vml" xmlns:p="http://schemas.openxmlformats.org/presentationml/2006/main" xmlns:c="http://schemas.openxmlformats.org/drawingml/2006/chart" xmlns:dgm="http://schemas.openxmlformats.org/drawingml/2006/diagram" xmlns:o="urn:schemas-microsoft-com:office:office" xmlns:v="urn:schemas-microsoft-com:vml" xmlns:pvml="urn:schemas-microsoft-com:office:powerpoint" xmlns:com="http://schemas.openxmlformats.org/drawingml/2006/compatibility" xmlns:p14="http://schemas.microsoft.com/office/powerpoint/2010/main" xmlns:p15="http://schemas.microsoft.com/office/powerpoint/2012/main" showMasterPhAnim="0" showMasterSp="0">
+  <p:cSld>
+    <p:spTree>
+      <p:nvGrpSpPr>
+        <p:cNvPr id="197" name="Shape 197"/>
+        <p:cNvGrpSpPr/>
+        <p:nvPr/>
+      </p:nvGrpSpPr>
+      <p:grpSpPr>
+        <a:xfrm>
+          <a:off x="0" y="0"/>
+          <a:ext cx="0" cy="0"/>
+          <a:chOff x="0" y="0"/>
+          <a:chExt cx="0" cy="0"/>
+        </a:xfrm>
+      </p:grpSpPr>
+      <p:sp>
+        <p:nvSpPr>
+          <p:cNvPr id="198" name="Google Shape;198;g73bdaa190b_0_87:notes"/>
+          <p:cNvSpPr/>
+          <p:nvPr>
+            <p:ph idx="2" type="sldImg"/>
+          </p:nvPr>
+        </p:nvSpPr>
+        <p:spPr>
+          <a:xfrm>
+            <a:off x="381300" y="685800"/>
+            <a:ext cx="6096000" cy="3429000"/>
+          </a:xfrm>
+          <a:custGeom>
+            <a:rect b="b" l="l" r="r" t="t"/>
+            <a:pathLst>
+              <a:path extrusionOk="0" h="120000" w="120000">
+                <a:moveTo>
+                  <a:pt x="0" y="0"/>
+                </a:moveTo>
+                <a:lnTo>
+                  <a:pt x="120000" y="0"/>
+                </a:lnTo>
+                <a:lnTo>
+                  <a:pt x="120000" y="120000"/>
+                </a:lnTo>
+                <a:lnTo>
+                  <a:pt x="0" y="120000"/>
+                </a:lnTo>
+                <a:close/>
+              </a:path>
+            </a:pathLst>
+          </a:custGeom>
+        </p:spPr>
+      </p:sp>
+      <p:sp>
+        <p:nvSpPr>
+          <p:cNvPr id="199" name="Google Shape;199;g73bdaa190b_0_87:notes"/>
+          <p:cNvSpPr txBox="1"/>
+          <p:nvPr>
+            <p:ph idx="1" type="body"/>
+          </p:nvPr>
+        </p:nvSpPr>
+        <p:spPr>
+          <a:xfrm>
+            <a:off x="685800" y="4343400"/>
+            <a:ext cx="5486400" cy="4114800"/>
+          </a:xfrm>
+          <a:prstGeom prst="rect">
+            <a:avLst/>
+          </a:prstGeom>
+        </p:spPr>
+        <p:txBody>
+          <a:bodyPr anchorCtr="0" anchor="t" bIns="91425" lIns="91425" spcFirstLastPara="1" rIns="91425" wrap="square" tIns="91425">
+            <a:noAutofit/>
+          </a:bodyPr>
+          <a:lstStyle/>
+          <a:p>
+            <a:pPr indent="0" lvl="0" marL="0" rtl="0" algn="l">
+              <a:spcBef>
+                <a:spcPts val="0"/>
+              </a:spcBef>
+              <a:spcAft>
+                <a:spcPts val="0"/>
+              </a:spcAft>
+              <a:buNone/>
+            </a:pPr>
+            <a:r>
+              <a:t/>
+            </a:r>
+            <a:endParaRPr/>
+          </a:p>
+        </p:txBody>
+      </p:sp>
+    </p:spTree>
+  </p:cSld>
+  <p:clrMapOvr>
+    <a:masterClrMapping/>
+  </p:clrMapOvr>
+</p:notes>
+</file>
+
 <file path=ppt/notesSlides/notesSlide3.xml><?xml version="1.0" encoding="utf-8"?>
 <p:notes xmlns:a="http://schemas.openxmlformats.org/drawingml/2006/main" xmlns:r="http://schemas.openxmlformats.org/officeDocument/2006/relationships" xmlns:mc="http://schemas.openxmlformats.org/markup-compatibility/2006" xmlns:mv="urn:schemas-microsoft-com:mac:vml" xmlns:p="http://schemas.openxmlformats.org/presentationml/2006/main" xmlns:c="http://schemas.openxmlformats.org/drawingml/2006/chart" xmlns:dgm="http://schemas.openxmlformats.org/drawingml/2006/diagram" xmlns:o="urn:schemas-microsoft-com:office:office" xmlns:v="urn:schemas-microsoft-com:vml" xmlns:pvml="urn:schemas-microsoft-com:office:powerpoint" xmlns:com="http://schemas.openxmlformats.org/drawingml/2006/compatibility" xmlns:p14="http://schemas.microsoft.com/office/powerpoint/2010/main" xmlns:p15="http://schemas.microsoft.com/office/powerpoint/2012/main" showMasterPhAnim="0" showMasterSp="0">
   <p:cSld>
@@ -2322,7 +2522,7 @@
       </p:grpSpPr>
       <p:sp>
         <p:nvSpPr>
-          <p:cNvPr id="126" name="Google Shape;126;g83316f0633_0_77:notes"/>
+          <p:cNvPr id="126" name="Google Shape;126;g73bdaa190b_0_5:notes"/>
           <p:cNvSpPr/>
           <p:nvPr>
             <p:ph idx="2" type="sldImg"/>
@@ -2357,7 +2557,7 @@
       </p:sp>
       <p:sp>
         <p:nvSpPr>
-          <p:cNvPr id="127" name="Google Shape;127;g83316f0633_0_77:notes"/>
+          <p:cNvPr id="127" name="Google Shape;127;g73bdaa190b_0_5:notes"/>
           <p:cNvSpPr txBox="1"/>
           <p:nvPr>
             <p:ph idx="1" type="body"/>
@@ -2421,7 +2621,7 @@
       </p:grpSpPr>
       <p:sp>
         <p:nvSpPr>
-          <p:cNvPr id="132" name="Google Shape;132;g83316f0633_0_82:notes"/>
+          <p:cNvPr id="132" name="Google Shape;132;g83316f0633_0_77:notes"/>
           <p:cNvSpPr/>
           <p:nvPr>
             <p:ph idx="2" type="sldImg"/>
@@ -2456,7 +2656,7 @@
       </p:sp>
       <p:sp>
         <p:nvSpPr>
-          <p:cNvPr id="133" name="Google Shape;133;g83316f0633_0_82:notes"/>
+          <p:cNvPr id="133" name="Google Shape;133;g83316f0633_0_77:notes"/>
           <p:cNvSpPr txBox="1"/>
           <p:nvPr>
             <p:ph idx="1" type="body"/>
@@ -9399,7 +9599,7 @@
             </a:pPr>
             <a:r>
               <a:rPr lang="en"/>
-              <a:t>Login/Logout</a:t>
+              <a:t>Registration</a:t>
             </a:r>
             <a:endParaRPr/>
           </a:p>
@@ -9439,11 +9639,15 @@
             </a:pPr>
             <a:r>
               <a:rPr lang="en"/>
-              <a:t>This task was also identified at the beginning of the project. This one was completed by the end of the second milestone and was also quite easy to implement and to use. The default django package was used for these and the links in the navbar were added custom and we linked up the pages to the right places after they were completed. </a:t>
+              <a:t>This task was identified at the very beginning of the project. Every authentication system needs some way to create a user account. It was also the first one that was finished, all the way back before the second milestone. This uses the default django registration package and is very easy to use. The page itself had another task put on in after it was created because the css made it so that all the text in the forms was white and impossible for a user to see. This was quickly fixed and it works smoothly by Dallin. Django has default </a:t>
             </a:r>
             <a:r>
               <a:rPr lang="en"/>
-              <a:t>Tests for this requirement are found in the acceptance testing document, test 3.</a:t>
+              <a:t>expectations</a:t>
+            </a:r>
+            <a:r>
+              <a:rPr lang="en"/>
+              <a:t> for passwords that are used for security. Tests for this requirement are found in the acceptance testing document, test 3.</a:t>
             </a:r>
             <a:endParaRPr/>
           </a:p>
@@ -9484,7 +9688,7 @@
         </p:nvSpPr>
         <p:spPr>
           <a:xfrm>
-            <a:off x="727650" y="1325700"/>
+            <a:off x="729450" y="1318650"/>
             <a:ext cx="7688700" cy="535200"/>
           </a:xfrm>
           <a:prstGeom prst="rect">
@@ -9508,7 +9712,7 @@
             </a:pPr>
             <a:r>
               <a:rPr lang="en"/>
-              <a:t>Conditional Showing of Login/Logout</a:t>
+              <a:t>Login/Logout</a:t>
             </a:r>
             <a:endParaRPr/>
           </a:p>
@@ -9548,20 +9752,7 @@
             </a:pPr>
             <a:r>
               <a:rPr lang="en"/>
-              <a:t>This was a slightly more difficult task to complete and one that we forgot to list at the beginning of the project. I finished the registration and login/logout pages and then realized that in order for a user to logout they’d have to navigate to </a:t>
-            </a:r>
-            <a:r>
-              <a:rPr lang="en" u="sng">
-                <a:solidFill>
-                  <a:schemeClr val="hlink"/>
-                </a:solidFill>
-                <a:hlinkClick r:id="rId3"/>
-              </a:rPr>
-              <a:t>http://localhost:8000/logout</a:t>
-            </a:r>
-            <a:r>
-              <a:rPr lang="en"/>
-              <a:t> and that was a problem. After doing a little more research I learned how to conditionally show something on a page whether a user is logged in or not and from there it was simply a matter of putting that code into the navbar. </a:t>
+              <a:t>This task was also identified at the beginning of the project. This one was completed by the end of the second milestone and was also quite easy to implement and to use. The default django package was used for these and the links in the navbar were added custom and we linked up the pages to the right places after they were completed. </a:t>
             </a:r>
             <a:r>
               <a:rPr lang="en"/>
@@ -9606,7 +9797,7 @@
         </p:nvSpPr>
         <p:spPr>
           <a:xfrm>
-            <a:off x="729450" y="1318650"/>
+            <a:off x="727650" y="1325700"/>
             <a:ext cx="7688700" cy="535200"/>
           </a:xfrm>
           <a:prstGeom prst="rect">
@@ -9630,7 +9821,7 @@
             </a:pPr>
             <a:r>
               <a:rPr lang="en"/>
-              <a:t>Homepage</a:t>
+              <a:t>Conditional Showing of Login/Logout</a:t>
             </a:r>
             <a:endParaRPr/>
           </a:p>
@@ -9670,15 +9861,24 @@
             </a:pPr>
             <a:r>
               <a:rPr lang="en"/>
-              <a:t>The homepage was an obvious requirement that must be implemented with any web interface. In the requirements </a:t>
+              <a:t>This was a slightly more difficult task to complete and one that we forgot to list at the beginning of the project. I finished the registration and login/logout pages and then realized that in order for a user to logout they’d have to navigate to </a:t>
+            </a:r>
+            <a:r>
+              <a:rPr lang="en" u="sng">
+                <a:solidFill>
+                  <a:schemeClr val="hlink"/>
+                </a:solidFill>
+                <a:hlinkClick r:id="rId3"/>
+              </a:rPr>
+              <a:t>http://localhost:8000/logout</a:t>
             </a:r>
             <a:r>
               <a:rPr lang="en"/>
-              <a:t>gathering</a:t>
+              <a:t> and that was a problem. After doing a little more research I learned how to conditionally show something on a page whether a user is logged in or not and from there it was simply a matter of putting that code into the navbar. </a:t>
             </a:r>
             <a:r>
               <a:rPr lang="en"/>
-              <a:t> phase, we found that our customer wanted a rotating carousel of images on the home page and a navigation bar.  Our low fidelity prototype can be found in the Prototypes folder in our documents section on Github.</a:t>
+              <a:t>Tests for this requirement are found in the acceptance testing document, test 3.</a:t>
             </a:r>
             <a:endParaRPr/>
           </a:p>
@@ -9743,7 +9943,7 @@
             </a:pPr>
             <a:r>
               <a:rPr lang="en"/>
-              <a:t>Designing</a:t>
+              <a:t>Homepage</a:t>
             </a:r>
             <a:endParaRPr/>
           </a:p>
@@ -9783,7 +9983,15 @@
             </a:pPr>
             <a:r>
               <a:rPr lang="en"/>
-              <a:t>Design choices for this were pretty straight forward; there are some boxes you need to tick with a homepage. It needs to be visually appealing, informative of what the site is for, and help you around the rest of the site. I (Brady) was in charge of the homepage and we used the header and footer for every page on the site for uniformity, so I wanted something that was easy to share between pages, but didn’t clash with anything that was on the other pages. I wanted the carousel to show people working with tools and inspire ideas for using the tools.</a:t>
+              <a:t>The homepage was an obvious requirement that must be implemented with any web interface. In the requirements </a:t>
+            </a:r>
+            <a:r>
+              <a:rPr lang="en"/>
+              <a:t>gathering</a:t>
+            </a:r>
+            <a:r>
+              <a:rPr lang="en"/>
+              <a:t> phase, we found that our customer wanted a rotating carousel of images on the home page and a navigation bar.  Our low fidelity prototype can be found in the Prototypes folder in our documents section on Github.</a:t>
             </a:r>
             <a:endParaRPr/>
           </a:p>
@@ -9848,7 +10056,7 @@
             </a:pPr>
             <a:r>
               <a:rPr lang="en"/>
-              <a:t>Developing</a:t>
+              <a:t>Designing</a:t>
             </a:r>
             <a:endParaRPr/>
           </a:p>
@@ -9888,7 +10096,11 @@
             </a:pPr>
             <a:r>
               <a:rPr lang="en"/>
-              <a:t>I decided to use Bootstrap because it supports carousels and navigation bars that aren’t only easy to implement, but are very readable. Bootstrap enabled me to fix a navbar to the top and the bottom, with links on the top and brand information on the bottom. Bootstrap also enabled a smooth carousel with controls and supports a library of icons that make the site look more professional. Testing can be found in the Acceptance Testing Document, Test 1.</a:t>
+              <a:t>Design choices for this were pretty straight forward; there are some boxes you need to tick with a homepage. It needs to be visually appealing, informative of what the site is for, and help you around the rest of the site. </a:t>
+            </a:r>
+            <a:r>
+              <a:rPr lang="en"/>
+              <a:t>I (Brady) was in charge of the homepage and we used the header and footer for every page on the site for uniformity, so I wanted something that was easy to share between pages, but didn’t clash with anything that was on the other pages. I wanted the carousel to show people working with tools and inspire ideas for using the tools.</a:t>
             </a:r>
             <a:endParaRPr/>
           </a:p>
@@ -9953,7 +10165,7 @@
             </a:pPr>
             <a:r>
               <a:rPr lang="en"/>
-              <a:t>Tool Reservations</a:t>
+              <a:t>Developing</a:t>
             </a:r>
             <a:endParaRPr/>
           </a:p>
@@ -9993,15 +10205,7 @@
             </a:pPr>
             <a:r>
               <a:rPr lang="en"/>
-              <a:t>The tool reservation page has been a MUST requirement from the start of the project. Our client’s needs revolved around the ability to track tools more easily along with allowing the community members a simple way to have access to desired tools. Our project’s low-</a:t>
-            </a:r>
-            <a:r>
-              <a:rPr lang="en"/>
-              <a:t>fidelity</a:t>
-            </a:r>
-            <a:r>
-              <a:rPr lang="en"/>
-              <a:t> prototype highlighted the desired functionality, though differing in execution and display. The tool reservation page encompaseses the requirements 3.x.x - 6.x.x in the project’s Requirements Definition document. Basic functionality testing was done in each scrum phrase on an “as-built” basis. Scrum phases for this requirement are as follows: implementing display/layout, adding reserve functionality, and integrating user/administrative abilities. Each phase was completed and directed by Sialao.</a:t>
+              <a:t>I decided to use Bootstrap because it supports carousels and navigation bars that aren’t only easy to implement, but are very readable. Bootstrap enabled me to fix a navbar to the top and the bottom, with links on the top and brand information on the bottom. Bootstrap also enabled a smooth carousel with controls and supports a library of icons that make the site look more professional. Testing can be found in the Acceptance Testing Document, Test 1.</a:t>
             </a:r>
             <a:endParaRPr/>
           </a:p>
@@ -10066,7 +10270,7 @@
             </a:pPr>
             <a:r>
               <a:rPr lang="en"/>
-              <a:t>Display</a:t>
+              <a:t>Tool Reservations</a:t>
             </a:r>
             <a:endParaRPr/>
           </a:p>
@@ -10106,7 +10310,15 @@
             </a:pPr>
             <a:r>
               <a:rPr lang="en"/>
-              <a:t>As shown in the project’s requirements definition (5.x), the display of the page played an important role in providing a simple and attractive interface for the users. All the requirements listed were able to be implemented. The work that went into the display features dealt mainly with creating Django html templates and creating the necessary views. This phase also including setting up the database to handle tool reservations. The styling was done by the project’s Front-End specialists, Dallin Packer and Brady Trappett.</a:t>
+              <a:t>The tool reservation page has been a MUST requirement from the start of the project. Our client’s needs revolved around the ability to track tools more easily along with allowing the community members a simple way to have access to desired tools. Our project’s low-</a:t>
+            </a:r>
+            <a:r>
+              <a:rPr lang="en"/>
+              <a:t>fidelity</a:t>
+            </a:r>
+            <a:r>
+              <a:rPr lang="en"/>
+              <a:t> prototype highlighted the desired functionality, though differing in execution and display. The tool reservation page encompaseses the requirements 3.x.x - 6.x.x in the project’s Requirements Definition document. Basic functionality testing was done in each scrum phrase on an “as-built” basis. Scrum phases for this requirement are as follows: implementing display/layout, adding reserve functionality, and integrating user/administrative abilities. Each phase was completed and directed by Sialao.</a:t>
             </a:r>
             <a:endParaRPr/>
           </a:p>
@@ -10171,7 +10383,7 @@
             </a:pPr>
             <a:r>
               <a:rPr lang="en"/>
-              <a:t>Reserve Functionality</a:t>
+              <a:t>Display</a:t>
             </a:r>
             <a:endParaRPr/>
           </a:p>
@@ -10211,7 +10423,7 @@
             </a:pPr>
             <a:r>
               <a:rPr lang="en"/>
-              <a:t>The ability to reserve a tool from the page proved to be the most difficult task in this requirement. This requirement consisted of requirement 4.x.x in the project’s Requirements Definition document. This function was not fully implemented going into the third sprint. Django provided a simple development environment along with easy ready-to-use tools that made most production straight forward, but developing dynamic content with JavaScript was difficult to integrate with Django. Due to this unforeseen obstacle the usability requirement of a “reserve” button was removed and changed to a more static implementation using html forms. This implementation may decrease the overall attractiveness of the reservation page, but the primary function of reserving tools provided.</a:t>
+              <a:t>As shown in the project’s requirements definition (5.x), the display of the page played an important role in providing a simple and attractive interface for the users. All the requirements listed were able to be implemented. The work that went into the display features dealt mainly with creating Django html templates and creating the necessary views. This phase also including setting up the database to handle tool reservations. The styling was done by the project’s Front-End specialists, Dallin Packer and Brady Trappett.</a:t>
             </a:r>
             <a:endParaRPr/>
           </a:p>
@@ -10276,7 +10488,7 @@
             </a:pPr>
             <a:r>
               <a:rPr lang="en"/>
-              <a:t>User Integration</a:t>
+              <a:t>Reserve Functionality</a:t>
             </a:r>
             <a:endParaRPr/>
           </a:p>
@@ -10285,6 +10497,111 @@
       <p:sp>
         <p:nvSpPr>
           <p:cNvPr id="190" name="Google Shape;190;p30"/>
+          <p:cNvSpPr txBox="1"/>
+          <p:nvPr>
+            <p:ph idx="1" type="body"/>
+          </p:nvPr>
+        </p:nvSpPr>
+        <p:spPr>
+          <a:xfrm>
+            <a:off x="729450" y="2078875"/>
+            <a:ext cx="7688700" cy="2261100"/>
+          </a:xfrm>
+          <a:prstGeom prst="rect">
+            <a:avLst/>
+          </a:prstGeom>
+        </p:spPr>
+        <p:txBody>
+          <a:bodyPr anchorCtr="0" anchor="t" bIns="91425" lIns="91425" spcFirstLastPara="1" rIns="91425" wrap="square" tIns="91425">
+            <a:noAutofit/>
+          </a:bodyPr>
+          <a:lstStyle/>
+          <a:p>
+            <a:pPr indent="0" lvl="0" marL="0" rtl="0" algn="l">
+              <a:spcBef>
+                <a:spcPts val="0"/>
+              </a:spcBef>
+              <a:spcAft>
+                <a:spcPts val="1600"/>
+              </a:spcAft>
+              <a:buNone/>
+            </a:pPr>
+            <a:r>
+              <a:rPr lang="en"/>
+              <a:t>The ability to reserve a tool from the page proved to be the most difficult task in this requirement. This requirement consisted of requirement 4.x.x in the project’s Requirements Definition document. This function was not fully implemented going into the third sprint. Django provided a simple development environment along with easy ready-to-use tools that made most production straight forward, but developing dynamic content with JavaScript was difficult to integrate with Django. Due to this unforeseen obstacle the usability requirement of a “reserve” button was removed and changed to a more static implementation using html forms. This implementation may decrease the overall attractiveness of the reservation page, but the primary function of reserving tools provided.</a:t>
+            </a:r>
+            <a:endParaRPr/>
+          </a:p>
+        </p:txBody>
+      </p:sp>
+    </p:spTree>
+  </p:cSld>
+  <p:clrMapOvr>
+    <a:masterClrMapping/>
+  </p:clrMapOvr>
+</p:sld>
+</file>
+
+<file path=ppt/slides/slide19.xml><?xml version="1.0" encoding="utf-8"?>
+<p:sld xmlns:a="http://schemas.openxmlformats.org/drawingml/2006/main" xmlns:r="http://schemas.openxmlformats.org/officeDocument/2006/relationships" xmlns:mc="http://schemas.openxmlformats.org/markup-compatibility/2006" xmlns:mv="urn:schemas-microsoft-com:mac:vml" xmlns:p="http://schemas.openxmlformats.org/presentationml/2006/main" xmlns:c="http://schemas.openxmlformats.org/drawingml/2006/chart" xmlns:dgm="http://schemas.openxmlformats.org/drawingml/2006/diagram" xmlns:o="urn:schemas-microsoft-com:office:office" xmlns:v="urn:schemas-microsoft-com:vml" xmlns:pvml="urn:schemas-microsoft-com:office:powerpoint" xmlns:com="http://schemas.openxmlformats.org/drawingml/2006/compatibility" xmlns:p14="http://schemas.microsoft.com/office/powerpoint/2010/main" xmlns:p15="http://schemas.microsoft.com/office/powerpoint/2012/main">
+  <p:cSld>
+    <p:spTree>
+      <p:nvGrpSpPr>
+        <p:cNvPr id="194" name="Shape 194"/>
+        <p:cNvGrpSpPr/>
+        <p:nvPr/>
+      </p:nvGrpSpPr>
+      <p:grpSpPr>
+        <a:xfrm>
+          <a:off x="0" y="0"/>
+          <a:ext cx="0" cy="0"/>
+          <a:chOff x="0" y="0"/>
+          <a:chExt cx="0" cy="0"/>
+        </a:xfrm>
+      </p:grpSpPr>
+      <p:sp>
+        <p:nvSpPr>
+          <p:cNvPr id="195" name="Google Shape;195;p31"/>
+          <p:cNvSpPr txBox="1"/>
+          <p:nvPr>
+            <p:ph type="title"/>
+          </p:nvPr>
+        </p:nvSpPr>
+        <p:spPr>
+          <a:xfrm>
+            <a:off x="729450" y="1318650"/>
+            <a:ext cx="7688700" cy="535200"/>
+          </a:xfrm>
+          <a:prstGeom prst="rect">
+            <a:avLst/>
+          </a:prstGeom>
+        </p:spPr>
+        <p:txBody>
+          <a:bodyPr anchorCtr="0" anchor="t" bIns="91425" lIns="91425" spcFirstLastPara="1" rIns="91425" wrap="square" tIns="91425">
+            <a:noAutofit/>
+          </a:bodyPr>
+          <a:lstStyle/>
+          <a:p>
+            <a:pPr indent="0" lvl="0" marL="0" rtl="0" algn="l">
+              <a:spcBef>
+                <a:spcPts val="0"/>
+              </a:spcBef>
+              <a:spcAft>
+                <a:spcPts val="0"/>
+              </a:spcAft>
+              <a:buNone/>
+            </a:pPr>
+            <a:r>
+              <a:rPr lang="en"/>
+              <a:t>User Integration</a:t>
+            </a:r>
+            <a:endParaRPr/>
+          </a:p>
+        </p:txBody>
+      </p:sp>
+      <p:sp>
+        <p:nvSpPr>
+          <p:cNvPr id="196" name="Google Shape;196;p31"/>
           <p:cNvSpPr txBox="1"/>
           <p:nvPr>
             <p:ph idx="1" type="body"/>
@@ -10806,6 +11123,110 @@
               <a:cs typeface="Lato"/>
               <a:sym typeface="Lato"/>
             </a:endParaRPr>
+          </a:p>
+        </p:txBody>
+      </p:sp>
+    </p:spTree>
+  </p:cSld>
+  <p:clrMapOvr>
+    <a:masterClrMapping/>
+  </p:clrMapOvr>
+</p:sld>
+</file>
+
+<file path=ppt/slides/slide20.xml><?xml version="1.0" encoding="utf-8"?>
+<p:sld xmlns:a="http://schemas.openxmlformats.org/drawingml/2006/main" xmlns:r="http://schemas.openxmlformats.org/officeDocument/2006/relationships" xmlns:mc="http://schemas.openxmlformats.org/markup-compatibility/2006" xmlns:mv="urn:schemas-microsoft-com:mac:vml" xmlns:p="http://schemas.openxmlformats.org/presentationml/2006/main" xmlns:c="http://schemas.openxmlformats.org/drawingml/2006/chart" xmlns:dgm="http://schemas.openxmlformats.org/drawingml/2006/diagram" xmlns:o="urn:schemas-microsoft-com:office:office" xmlns:v="urn:schemas-microsoft-com:vml" xmlns:pvml="urn:schemas-microsoft-com:office:powerpoint" xmlns:com="http://schemas.openxmlformats.org/drawingml/2006/compatibility" xmlns:p14="http://schemas.microsoft.com/office/powerpoint/2010/main" xmlns:p15="http://schemas.microsoft.com/office/powerpoint/2012/main">
+  <p:cSld>
+    <p:spTree>
+      <p:nvGrpSpPr>
+        <p:cNvPr id="200" name="Shape 200"/>
+        <p:cNvGrpSpPr/>
+        <p:nvPr/>
+      </p:nvGrpSpPr>
+      <p:grpSpPr>
+        <a:xfrm>
+          <a:off x="0" y="0"/>
+          <a:ext cx="0" cy="0"/>
+          <a:chOff x="0" y="0"/>
+          <a:chExt cx="0" cy="0"/>
+        </a:xfrm>
+      </p:grpSpPr>
+      <p:sp>
+        <p:nvSpPr>
+          <p:cNvPr id="201" name="Google Shape;201;p32"/>
+          <p:cNvSpPr txBox="1"/>
+          <p:nvPr>
+            <p:ph type="title"/>
+          </p:nvPr>
+        </p:nvSpPr>
+        <p:spPr>
+          <a:xfrm>
+            <a:off x="729450" y="1318650"/>
+            <a:ext cx="7688700" cy="535200"/>
+          </a:xfrm>
+          <a:prstGeom prst="rect">
+            <a:avLst/>
+          </a:prstGeom>
+        </p:spPr>
+        <p:txBody>
+          <a:bodyPr anchorCtr="0" anchor="t" bIns="91425" lIns="91425" spcFirstLastPara="1" rIns="91425" wrap="square" tIns="91425">
+            <a:noAutofit/>
+          </a:bodyPr>
+          <a:lstStyle/>
+          <a:p>
+            <a:pPr indent="0" lvl="0" marL="0" rtl="0" algn="l">
+              <a:spcBef>
+                <a:spcPts val="0"/>
+              </a:spcBef>
+              <a:spcAft>
+                <a:spcPts val="0"/>
+              </a:spcAft>
+              <a:buNone/>
+            </a:pPr>
+            <a:r>
+              <a:rPr lang="en"/>
+              <a:t>Questions?</a:t>
+            </a:r>
+            <a:endParaRPr/>
+          </a:p>
+        </p:txBody>
+      </p:sp>
+      <p:sp>
+        <p:nvSpPr>
+          <p:cNvPr id="202" name="Google Shape;202;p32"/>
+          <p:cNvSpPr txBox="1"/>
+          <p:nvPr>
+            <p:ph idx="1" type="body"/>
+          </p:nvPr>
+        </p:nvSpPr>
+        <p:spPr>
+          <a:xfrm>
+            <a:off x="729450" y="2078875"/>
+            <a:ext cx="7688700" cy="2261100"/>
+          </a:xfrm>
+          <a:prstGeom prst="rect">
+            <a:avLst/>
+          </a:prstGeom>
+        </p:spPr>
+        <p:txBody>
+          <a:bodyPr anchorCtr="0" anchor="t" bIns="91425" lIns="91425" spcFirstLastPara="1" rIns="91425" wrap="square" tIns="91425">
+            <a:noAutofit/>
+          </a:bodyPr>
+          <a:lstStyle/>
+          <a:p>
+            <a:pPr indent="0" lvl="0" marL="0" rtl="0" algn="l">
+              <a:spcBef>
+                <a:spcPts val="0"/>
+              </a:spcBef>
+              <a:spcAft>
+                <a:spcPts val="1600"/>
+              </a:spcAft>
+              <a:buNone/>
+            </a:pPr>
+            <a:r>
+              <a:t/>
+            </a:r>
+            <a:endParaRPr/>
           </a:p>
         </p:txBody>
       </p:sp>
@@ -12238,13 +12659,13 @@
           <p:cNvPr id="129" name="Google Shape;129;p20"/>
           <p:cNvSpPr txBox="1"/>
           <p:nvPr>
-            <p:ph type="title"/>
+            <p:ph type="ctrTitle"/>
           </p:nvPr>
         </p:nvSpPr>
         <p:spPr>
           <a:xfrm>
-            <a:off x="729450" y="1318650"/>
-            <a:ext cx="7688700" cy="535200"/>
+            <a:off x="729450" y="1322450"/>
+            <a:ext cx="7688100" cy="874200"/>
           </a:xfrm>
           <a:prstGeom prst="rect">
             <a:avLst/>
@@ -12267,7 +12688,7 @@
             </a:pPr>
             <a:r>
               <a:rPr lang="en"/>
-              <a:t>User Authentication Development</a:t>
+              <a:t>Resources</a:t>
             </a:r>
             <a:endParaRPr/>
           </a:p>
@@ -12278,13 +12699,13 @@
           <p:cNvPr id="130" name="Google Shape;130;p20"/>
           <p:cNvSpPr txBox="1"/>
           <p:nvPr>
-            <p:ph idx="1" type="body"/>
+            <p:ph idx="1" type="subTitle"/>
           </p:nvPr>
         </p:nvSpPr>
         <p:spPr>
           <a:xfrm>
-            <a:off x="729450" y="2078875"/>
-            <a:ext cx="7688700" cy="2261100"/>
+            <a:off x="729625" y="2400300"/>
+            <a:ext cx="7688100" cy="1313700"/>
           </a:xfrm>
           <a:prstGeom prst="rect">
             <a:avLst/>
@@ -12307,39 +12728,102 @@
             </a:pPr>
             <a:r>
               <a:rPr lang="en"/>
-              <a:t>We first established the need for a user login system in our requirements definition in part 2 and in our User Class UML diagram. Over time we adapted our </a:t>
-            </a:r>
-            <a:r>
-              <a:rPr lang="en"/>
-              <a:t>requirements</a:t>
-            </a:r>
-            <a:r>
-              <a:rPr lang="en"/>
-              <a:t> to be more </a:t>
-            </a:r>
-            <a:r>
-              <a:rPr lang="en"/>
-              <a:t>appropriate</a:t>
-            </a:r>
-            <a:r>
-              <a:rPr lang="en"/>
-              <a:t> for the limitations of this class. We used the default user model from Django and the built in authentication system. This requirement was a MUST on our list. It is used by everyone and is crucial to the page being able to function. Due to its importance it needed be very reliable, functional, and easily usable by everyone.</a:t>
+              <a:t>-Django docs </a:t>
             </a:r>
             <a:endParaRPr/>
           </a:p>
           <a:p>
             <a:pPr indent="0" lvl="0" marL="0" rtl="0" algn="l">
               <a:spcBef>
-                <a:spcPts val="1600"/>
-              </a:spcBef>
-              <a:spcAft>
-                <a:spcPts val="1600"/>
+                <a:spcPts val="0"/>
+              </a:spcBef>
+              <a:spcAft>
+                <a:spcPts val="0"/>
               </a:spcAft>
               <a:buNone/>
             </a:pPr>
             <a:r>
               <a:rPr lang="en"/>
-              <a:t>I, Hunter, was in charge of this part of the website. The tasks that went into this part of the website will be outlined in the following slides.</a:t>
+              <a:t>Figuring out the server and file structure</a:t>
+            </a:r>
+            <a:endParaRPr/>
+          </a:p>
+          <a:p>
+            <a:pPr indent="0" lvl="0" marL="0" rtl="0" algn="l">
+              <a:spcBef>
+                <a:spcPts val="0"/>
+              </a:spcBef>
+              <a:spcAft>
+                <a:spcPts val="0"/>
+              </a:spcAft>
+              <a:buNone/>
+            </a:pPr>
+            <a:r>
+              <a:rPr lang="en"/>
+              <a:t>-Bootstrap docs</a:t>
+            </a:r>
+            <a:endParaRPr/>
+          </a:p>
+          <a:p>
+            <a:pPr indent="0" lvl="0" marL="0" rtl="0" algn="l">
+              <a:spcBef>
+                <a:spcPts val="0"/>
+              </a:spcBef>
+              <a:spcAft>
+                <a:spcPts val="0"/>
+              </a:spcAft>
+              <a:buNone/>
+            </a:pPr>
+            <a:r>
+              <a:rPr lang="en"/>
+              <a:t>Help with header, footer, and carousel</a:t>
+            </a:r>
+            <a:endParaRPr/>
+          </a:p>
+          <a:p>
+            <a:pPr indent="0" lvl="0" marL="0" rtl="0" algn="l">
+              <a:spcBef>
+                <a:spcPts val="0"/>
+              </a:spcBef>
+              <a:spcAft>
+                <a:spcPts val="0"/>
+              </a:spcAft>
+              <a:buNone/>
+            </a:pPr>
+            <a:r>
+              <a:rPr lang="en"/>
+              <a:t>-YouTube videos</a:t>
+            </a:r>
+            <a:endParaRPr/>
+          </a:p>
+          <a:p>
+            <a:pPr indent="0" lvl="0" marL="0" rtl="0" algn="l">
+              <a:spcBef>
+                <a:spcPts val="0"/>
+              </a:spcBef>
+              <a:spcAft>
+                <a:spcPts val="0"/>
+              </a:spcAft>
+              <a:buNone/>
+            </a:pPr>
+            <a:r>
+              <a:rPr lang="en"/>
+              <a:t>Help with the backend of Django</a:t>
+            </a:r>
+            <a:endParaRPr/>
+          </a:p>
+          <a:p>
+            <a:pPr indent="0" lvl="0" marL="0" rtl="0" algn="l">
+              <a:spcBef>
+                <a:spcPts val="0"/>
+              </a:spcBef>
+              <a:spcAft>
+                <a:spcPts val="0"/>
+              </a:spcAft>
+              <a:buNone/>
+            </a:pPr>
+            <a:r>
+              <a:t/>
             </a:r>
             <a:endParaRPr/>
           </a:p>
@@ -12404,7 +12888,7 @@
             </a:pPr>
             <a:r>
               <a:rPr lang="en"/>
-              <a:t>Registration</a:t>
+              <a:t>User Authentication Development</a:t>
             </a:r>
             <a:endParaRPr/>
           </a:p>
@@ -12438,21 +12922,45 @@
                 <a:spcPts val="0"/>
               </a:spcBef>
               <a:spcAft>
+                <a:spcPts val="0"/>
+              </a:spcAft>
+              <a:buNone/>
+            </a:pPr>
+            <a:r>
+              <a:rPr lang="en"/>
+              <a:t>We first established the need for a user login system in our requirements definition in part 2 and in our User Class UML diagram. Over time we adapted our </a:t>
+            </a:r>
+            <a:r>
+              <a:rPr lang="en"/>
+              <a:t>requirements</a:t>
+            </a:r>
+            <a:r>
+              <a:rPr lang="en"/>
+              <a:t> to be more </a:t>
+            </a:r>
+            <a:r>
+              <a:rPr lang="en"/>
+              <a:t>appropriate</a:t>
+            </a:r>
+            <a:r>
+              <a:rPr lang="en"/>
+              <a:t> for the limitations of this class. We used the default user model from Django and the built in authentication system. This requirement was a MUST on our list. It is used by everyone and is crucial to the page being able to function. Due to its importance it needed be very reliable, functional, and easily usable by everyone.</a:t>
+            </a:r>
+            <a:endParaRPr/>
+          </a:p>
+          <a:p>
+            <a:pPr indent="0" lvl="0" marL="0" rtl="0" algn="l">
+              <a:spcBef>
                 <a:spcPts val="1600"/>
+              </a:spcBef>
+              <a:spcAft>
+                <a:spcPts val="1600"/>
               </a:spcAft>
               <a:buNone/>
             </a:pPr>
             <a:r>
               <a:rPr lang="en"/>
-              <a:t>This task was identified at the very beginning of the project. Every authentication system needs some way to create a user account. It was also the first one that was finished, all the way back before the second milestone. This uses the default django registration package and is very easy to use. The page itself had another task put on in after it was created because the css made it so that all the text in the forms was white and impossible for a user to see. This was quickly fixed and it works smoothly by Dallin. Django has default </a:t>
-            </a:r>
-            <a:r>
-              <a:rPr lang="en"/>
-              <a:t>expectations</a:t>
-            </a:r>
-            <a:r>
-              <a:rPr lang="en"/>
-              <a:t> for passwords that are used for security. Tests for this requirement are found in the acceptance testing document, test 3.</a:t>
+              <a:t>I, Hunter, was in charge of this part of the website. The tasks that went into this part of the website will be outlined in the following slides.</a:t>
             </a:r>
             <a:endParaRPr/>
           </a:p>
@@ -12467,6 +12975,285 @@
 </file>
 
 <file path=ppt/theme/theme1.xml><?xml version="1.0" encoding="utf-8"?>
+<a:theme xmlns:a="http://schemas.openxmlformats.org/drawingml/2006/main" xmlns:r="http://schemas.openxmlformats.org/officeDocument/2006/relationships" name="Streamline">
+  <a:themeElements>
+    <a:clrScheme name="Streamline">
+      <a:dk1>
+        <a:srgbClr val="1A9988"/>
+      </a:dk1>
+      <a:lt1>
+        <a:srgbClr val="FFFFFF"/>
+      </a:lt1>
+      <a:dk2>
+        <a:srgbClr val="1A1A1A"/>
+      </a:dk2>
+      <a:lt2>
+        <a:srgbClr val="E9EDEE"/>
+      </a:lt2>
+      <a:accent1>
+        <a:srgbClr val="595959"/>
+      </a:accent1>
+      <a:accent2>
+        <a:srgbClr val="6AA4C8"/>
+      </a:accent2>
+      <a:accent3>
+        <a:srgbClr val="EB5600"/>
+      </a:accent3>
+      <a:accent4>
+        <a:srgbClr val="A2FFE8"/>
+      </a:accent4>
+      <a:accent5>
+        <a:srgbClr val="1C3678"/>
+      </a:accent5>
+      <a:accent6>
+        <a:srgbClr val="FFB8A2"/>
+      </a:accent6>
+      <a:hlink>
+        <a:srgbClr val="1C3678"/>
+      </a:hlink>
+      <a:folHlink>
+        <a:srgbClr val="1C3678"/>
+      </a:folHlink>
+    </a:clrScheme>
+    <a:fontScheme name="Office">
+      <a:majorFont>
+        <a:latin typeface="Arial"/>
+        <a:ea typeface=""/>
+        <a:cs typeface=""/>
+        <a:font script="Jpan" typeface="ＭＳ Ｐゴシック"/>
+        <a:font script="Hang" typeface="맑은 고딕"/>
+        <a:font script="Hans" typeface="宋体"/>
+        <a:font script="Hant" typeface="新細明體"/>
+        <a:font script="Arab" typeface="Times New Roman"/>
+        <a:font script="Hebr" typeface="Times New Roman"/>
+        <a:font script="Thai" typeface="Angsana New"/>
+        <a:font script="Ethi" typeface="Nyala"/>
+        <a:font script="Beng" typeface="Vrinda"/>
+        <a:font script="Gujr" typeface="Shruti"/>
+        <a:font script="Khmr" typeface="MoolBoran"/>
+        <a:font script="Knda" typeface="Tunga"/>
+        <a:font script="Guru" typeface="Raavi"/>
+        <a:font script="Cans" typeface="Euphemia"/>
+        <a:font script="Cher" typeface="Plantagenet Cherokee"/>
+        <a:font script="Yiii" typeface="Microsoft Yi Baiti"/>
+        <a:font script="Tibt" typeface="Microsoft Himalaya"/>
+        <a:font script="Thaa" typeface="MV Boli"/>
+        <a:font script="Deva" typeface="Mangal"/>
+        <a:font script="Telu" typeface="Gautami"/>
+        <a:font script="Taml" typeface="Latha"/>
+        <a:font script="Syrc" typeface="Estrangelo Edessa"/>
+        <a:font script="Orya" typeface="Kalinga"/>
+        <a:font script="Mlym" typeface="Kartika"/>
+        <a:font script="Laoo" typeface="DokChampa"/>
+        <a:font script="Sinh" typeface="Iskoola Pota"/>
+        <a:font script="Mong" typeface="Mongolian Baiti"/>
+        <a:font script="Viet" typeface="Times New Roman"/>
+        <a:font script="Uigh" typeface="Microsoft Uighur"/>
+        <a:font script="Geor" typeface="Sylfaen"/>
+      </a:majorFont>
+      <a:minorFont>
+        <a:latin typeface="Arial"/>
+        <a:ea typeface=""/>
+        <a:cs typeface=""/>
+        <a:font script="Jpan" typeface="ＭＳ Ｐゴシック"/>
+        <a:font script="Hang" typeface="맑은 고딕"/>
+        <a:font script="Hans" typeface="宋体"/>
+        <a:font script="Hant" typeface="新細明體"/>
+        <a:font script="Arab" typeface="Arial"/>
+        <a:font script="Hebr" typeface="Arial"/>
+        <a:font script="Thai" typeface="Cordia New"/>
+        <a:font script="Ethi" typeface="Nyala"/>
+        <a:font script="Beng" typeface="Vrinda"/>
+        <a:font script="Gujr" typeface="Shruti"/>
+        <a:font script="Khmr" typeface="DaunPenh"/>
+        <a:font script="Knda" typeface="Tunga"/>
+        <a:font script="Guru" typeface="Raavi"/>
+        <a:font script="Cans" typeface="Euphemia"/>
+        <a:font script="Cher" typeface="Plantagenet Cherokee"/>
+        <a:font script="Yiii" typeface="Microsoft Yi Baiti"/>
+        <a:font script="Tibt" typeface="Microsoft Himalaya"/>
+        <a:font script="Thaa" typeface="MV Boli"/>
+        <a:font script="Deva" typeface="Mangal"/>
+        <a:font script="Telu" typeface="Gautami"/>
+        <a:font script="Taml" typeface="Latha"/>
+        <a:font script="Syrc" typeface="Estrangelo Edessa"/>
+        <a:font script="Orya" typeface="Kalinga"/>
+        <a:font script="Mlym" typeface="Kartika"/>
+        <a:font script="Laoo" typeface="DokChampa"/>
+        <a:font script="Sinh" typeface="Iskoola Pota"/>
+        <a:font script="Mong" typeface="Mongolian Baiti"/>
+        <a:font script="Viet" typeface="Arial"/>
+        <a:font script="Uigh" typeface="Microsoft Uighur"/>
+        <a:font script="Geor" typeface="Sylfaen"/>
+      </a:minorFont>
+    </a:fontScheme>
+    <a:fmtScheme name="Office">
+      <a:fillStyleLst>
+        <a:solidFill>
+          <a:schemeClr val="phClr"/>
+        </a:solidFill>
+        <a:gradFill rotWithShape="1">
+          <a:gsLst>
+            <a:gs pos="0">
+              <a:schemeClr val="phClr">
+                <a:tint val="50000"/>
+                <a:satMod val="300000"/>
+              </a:schemeClr>
+            </a:gs>
+            <a:gs pos="35000">
+              <a:schemeClr val="phClr">
+                <a:tint val="37000"/>
+                <a:satMod val="300000"/>
+              </a:schemeClr>
+            </a:gs>
+            <a:gs pos="100000">
+              <a:schemeClr val="phClr">
+                <a:tint val="15000"/>
+                <a:satMod val="350000"/>
+              </a:schemeClr>
+            </a:gs>
+          </a:gsLst>
+          <a:lin ang="16200000" scaled="1"/>
+        </a:gradFill>
+        <a:gradFill rotWithShape="1">
+          <a:gsLst>
+            <a:gs pos="0">
+              <a:schemeClr val="phClr">
+                <a:tint val="100000"/>
+                <a:shade val="100000"/>
+                <a:satMod val="130000"/>
+              </a:schemeClr>
+            </a:gs>
+            <a:gs pos="100000">
+              <a:schemeClr val="phClr">
+                <a:tint val="50000"/>
+                <a:shade val="100000"/>
+                <a:satMod val="350000"/>
+              </a:schemeClr>
+            </a:gs>
+          </a:gsLst>
+          <a:lin ang="16200000" scaled="0"/>
+        </a:gradFill>
+      </a:fillStyleLst>
+      <a:lnStyleLst>
+        <a:ln w="9525" cap="flat" cmpd="sng" algn="ctr">
+          <a:solidFill>
+            <a:schemeClr val="phClr">
+              <a:shade val="95000"/>
+              <a:satMod val="105000"/>
+            </a:schemeClr>
+          </a:solidFill>
+          <a:prstDash val="solid"/>
+        </a:ln>
+        <a:ln w="25400" cap="flat" cmpd="sng" algn="ctr">
+          <a:solidFill>
+            <a:schemeClr val="phClr"/>
+          </a:solidFill>
+          <a:prstDash val="solid"/>
+        </a:ln>
+        <a:ln w="38100" cap="flat" cmpd="sng" algn="ctr">
+          <a:solidFill>
+            <a:schemeClr val="phClr"/>
+          </a:solidFill>
+          <a:prstDash val="solid"/>
+        </a:ln>
+      </a:lnStyleLst>
+      <a:effectStyleLst>
+        <a:effectStyle>
+          <a:effectLst>
+            <a:outerShdw blurRad="40000" dist="20000" dir="5400000" rotWithShape="0">
+              <a:srgbClr val="000000">
+                <a:alpha val="38000"/>
+              </a:srgbClr>
+            </a:outerShdw>
+          </a:effectLst>
+        </a:effectStyle>
+        <a:effectStyle>
+          <a:effectLst>
+            <a:outerShdw blurRad="40000" dist="23000" dir="5400000" rotWithShape="0">
+              <a:srgbClr val="000000">
+                <a:alpha val="35000"/>
+              </a:srgbClr>
+            </a:outerShdw>
+          </a:effectLst>
+        </a:effectStyle>
+        <a:effectStyle>
+          <a:effectLst>
+            <a:outerShdw blurRad="40000" dist="23000" dir="5400000" rotWithShape="0">
+              <a:srgbClr val="000000">
+                <a:alpha val="35000"/>
+              </a:srgbClr>
+            </a:outerShdw>
+          </a:effectLst>
+          <a:scene3d>
+            <a:camera prst="orthographicFront">
+              <a:rot lat="0" lon="0" rev="0"/>
+            </a:camera>
+            <a:lightRig rig="threePt" dir="t">
+              <a:rot lat="0" lon="0" rev="1200000"/>
+            </a:lightRig>
+          </a:scene3d>
+          <a:sp3d>
+            <a:bevelT w="63500" h="25400"/>
+          </a:sp3d>
+        </a:effectStyle>
+      </a:effectStyleLst>
+      <a:bgFillStyleLst>
+        <a:solidFill>
+          <a:schemeClr val="phClr"/>
+        </a:solidFill>
+        <a:gradFill rotWithShape="1">
+          <a:gsLst>
+            <a:gs pos="0">
+              <a:schemeClr val="phClr">
+                <a:tint val="40000"/>
+                <a:satMod val="350000"/>
+              </a:schemeClr>
+            </a:gs>
+            <a:gs pos="40000">
+              <a:schemeClr val="phClr">
+                <a:tint val="45000"/>
+                <a:shade val="99000"/>
+                <a:satMod val="350000"/>
+              </a:schemeClr>
+            </a:gs>
+            <a:gs pos="100000">
+              <a:schemeClr val="phClr">
+                <a:shade val="20000"/>
+                <a:satMod val="255000"/>
+              </a:schemeClr>
+            </a:gs>
+          </a:gsLst>
+          <a:path path="circle">
+            <a:fillToRect l="50000" t="-80000" r="50000" b="180000"/>
+          </a:path>
+        </a:gradFill>
+        <a:gradFill rotWithShape="1">
+          <a:gsLst>
+            <a:gs pos="0">
+              <a:schemeClr val="phClr">
+                <a:tint val="80000"/>
+                <a:satMod val="300000"/>
+              </a:schemeClr>
+            </a:gs>
+            <a:gs pos="100000">
+              <a:schemeClr val="phClr">
+                <a:shade val="30000"/>
+                <a:satMod val="200000"/>
+              </a:schemeClr>
+            </a:gs>
+          </a:gsLst>
+          <a:path path="circle">
+            <a:fillToRect l="50000" t="50000" r="50000" b="50000"/>
+          </a:path>
+        </a:gradFill>
+      </a:bgFillStyleLst>
+    </a:fmtScheme>
+  </a:themeElements>
+</a:theme>
+</file>
+
+<file path=ppt/theme/theme2.xml><?xml version="1.0" encoding="utf-8"?>
 <a:theme xmlns:a="http://schemas.openxmlformats.org/drawingml/2006/main" xmlns:r="http://schemas.openxmlformats.org/officeDocument/2006/relationships">
   <a:themeElements>
     <a:clrScheme name="Default">
@@ -12743,283 +13530,4 @@
     </a:fmtScheme>
   </a:themeElements>
 </a:theme>
-</file>
-
-<file path=ppt/theme/theme2.xml><?xml version="1.0" encoding="utf-8"?>
-<a:theme xmlns:a="http://schemas.openxmlformats.org/drawingml/2006/main" xmlns:r="http://schemas.openxmlformats.org/officeDocument/2006/relationships" name="Streamline">
-  <a:themeElements>
-    <a:clrScheme name="Streamline">
-      <a:dk1>
-        <a:srgbClr val="1A9988"/>
-      </a:dk1>
-      <a:lt1>
-        <a:srgbClr val="FFFFFF"/>
-      </a:lt1>
-      <a:dk2>
-        <a:srgbClr val="1A1A1A"/>
-      </a:dk2>
-      <a:lt2>
-        <a:srgbClr val="E9EDEE"/>
-      </a:lt2>
-      <a:accent1>
-        <a:srgbClr val="595959"/>
-      </a:accent1>
-      <a:accent2>
-        <a:srgbClr val="6AA4C8"/>
-      </a:accent2>
-      <a:accent3>
-        <a:srgbClr val="EB5600"/>
-      </a:accent3>
-      <a:accent4>
-        <a:srgbClr val="A2FFE8"/>
-      </a:accent4>
-      <a:accent5>
-        <a:srgbClr val="1C3678"/>
-      </a:accent5>
-      <a:accent6>
-        <a:srgbClr val="FFB8A2"/>
-      </a:accent6>
-      <a:hlink>
-        <a:srgbClr val="1C3678"/>
-      </a:hlink>
-      <a:folHlink>
-        <a:srgbClr val="1C3678"/>
-      </a:folHlink>
-    </a:clrScheme>
-    <a:fontScheme name="Office">
-      <a:majorFont>
-        <a:latin typeface="Arial"/>
-        <a:ea typeface=""/>
-        <a:cs typeface=""/>
-        <a:font script="Jpan" typeface="ＭＳ Ｐゴシック"/>
-        <a:font script="Hang" typeface="맑은 고딕"/>
-        <a:font script="Hans" typeface="宋体"/>
-        <a:font script="Hant" typeface="新細明體"/>
-        <a:font script="Arab" typeface="Times New Roman"/>
-        <a:font script="Hebr" typeface="Times New Roman"/>
-        <a:font script="Thai" typeface="Angsana New"/>
-        <a:font script="Ethi" typeface="Nyala"/>
-        <a:font script="Beng" typeface="Vrinda"/>
-        <a:font script="Gujr" typeface="Shruti"/>
-        <a:font script="Khmr" typeface="MoolBoran"/>
-        <a:font script="Knda" typeface="Tunga"/>
-        <a:font script="Guru" typeface="Raavi"/>
-        <a:font script="Cans" typeface="Euphemia"/>
-        <a:font script="Cher" typeface="Plantagenet Cherokee"/>
-        <a:font script="Yiii" typeface="Microsoft Yi Baiti"/>
-        <a:font script="Tibt" typeface="Microsoft Himalaya"/>
-        <a:font script="Thaa" typeface="MV Boli"/>
-        <a:font script="Deva" typeface="Mangal"/>
-        <a:font script="Telu" typeface="Gautami"/>
-        <a:font script="Taml" typeface="Latha"/>
-        <a:font script="Syrc" typeface="Estrangelo Edessa"/>
-        <a:font script="Orya" typeface="Kalinga"/>
-        <a:font script="Mlym" typeface="Kartika"/>
-        <a:font script="Laoo" typeface="DokChampa"/>
-        <a:font script="Sinh" typeface="Iskoola Pota"/>
-        <a:font script="Mong" typeface="Mongolian Baiti"/>
-        <a:font script="Viet" typeface="Times New Roman"/>
-        <a:font script="Uigh" typeface="Microsoft Uighur"/>
-        <a:font script="Geor" typeface="Sylfaen"/>
-      </a:majorFont>
-      <a:minorFont>
-        <a:latin typeface="Arial"/>
-        <a:ea typeface=""/>
-        <a:cs typeface=""/>
-        <a:font script="Jpan" typeface="ＭＳ Ｐゴシック"/>
-        <a:font script="Hang" typeface="맑은 고딕"/>
-        <a:font script="Hans" typeface="宋体"/>
-        <a:font script="Hant" typeface="新細明體"/>
-        <a:font script="Arab" typeface="Arial"/>
-        <a:font script="Hebr" typeface="Arial"/>
-        <a:font script="Thai" typeface="Cordia New"/>
-        <a:font script="Ethi" typeface="Nyala"/>
-        <a:font script="Beng" typeface="Vrinda"/>
-        <a:font script="Gujr" typeface="Shruti"/>
-        <a:font script="Khmr" typeface="DaunPenh"/>
-        <a:font script="Knda" typeface="Tunga"/>
-        <a:font script="Guru" typeface="Raavi"/>
-        <a:font script="Cans" typeface="Euphemia"/>
-        <a:font script="Cher" typeface="Plantagenet Cherokee"/>
-        <a:font script="Yiii" typeface="Microsoft Yi Baiti"/>
-        <a:font script="Tibt" typeface="Microsoft Himalaya"/>
-        <a:font script="Thaa" typeface="MV Boli"/>
-        <a:font script="Deva" typeface="Mangal"/>
-        <a:font script="Telu" typeface="Gautami"/>
-        <a:font script="Taml" typeface="Latha"/>
-        <a:font script="Syrc" typeface="Estrangelo Edessa"/>
-        <a:font script="Orya" typeface="Kalinga"/>
-        <a:font script="Mlym" typeface="Kartika"/>
-        <a:font script="Laoo" typeface="DokChampa"/>
-        <a:font script="Sinh" typeface="Iskoola Pota"/>
-        <a:font script="Mong" typeface="Mongolian Baiti"/>
-        <a:font script="Viet" typeface="Arial"/>
-        <a:font script="Uigh" typeface="Microsoft Uighur"/>
-        <a:font script="Geor" typeface="Sylfaen"/>
-      </a:minorFont>
-    </a:fontScheme>
-    <a:fmtScheme name="Office">
-      <a:fillStyleLst>
-        <a:solidFill>
-          <a:schemeClr val="phClr"/>
-        </a:solidFill>
-        <a:gradFill rotWithShape="1">
-          <a:gsLst>
-            <a:gs pos="0">
-              <a:schemeClr val="phClr">
-                <a:tint val="50000"/>
-                <a:satMod val="300000"/>
-              </a:schemeClr>
-            </a:gs>
-            <a:gs pos="35000">
-              <a:schemeClr val="phClr">
-                <a:tint val="37000"/>
-                <a:satMod val="300000"/>
-              </a:schemeClr>
-            </a:gs>
-            <a:gs pos="100000">
-              <a:schemeClr val="phClr">
-                <a:tint val="15000"/>
-                <a:satMod val="350000"/>
-              </a:schemeClr>
-            </a:gs>
-          </a:gsLst>
-          <a:lin ang="16200000" scaled="1"/>
-        </a:gradFill>
-        <a:gradFill rotWithShape="1">
-          <a:gsLst>
-            <a:gs pos="0">
-              <a:schemeClr val="phClr">
-                <a:tint val="100000"/>
-                <a:shade val="100000"/>
-                <a:satMod val="130000"/>
-              </a:schemeClr>
-            </a:gs>
-            <a:gs pos="100000">
-              <a:schemeClr val="phClr">
-                <a:tint val="50000"/>
-                <a:shade val="100000"/>
-                <a:satMod val="350000"/>
-              </a:schemeClr>
-            </a:gs>
-          </a:gsLst>
-          <a:lin ang="16200000" scaled="0"/>
-        </a:gradFill>
-      </a:fillStyleLst>
-      <a:lnStyleLst>
-        <a:ln w="9525" cap="flat" cmpd="sng" algn="ctr">
-          <a:solidFill>
-            <a:schemeClr val="phClr">
-              <a:shade val="95000"/>
-              <a:satMod val="105000"/>
-            </a:schemeClr>
-          </a:solidFill>
-          <a:prstDash val="solid"/>
-        </a:ln>
-        <a:ln w="25400" cap="flat" cmpd="sng" algn="ctr">
-          <a:solidFill>
-            <a:schemeClr val="phClr"/>
-          </a:solidFill>
-          <a:prstDash val="solid"/>
-        </a:ln>
-        <a:ln w="38100" cap="flat" cmpd="sng" algn="ctr">
-          <a:solidFill>
-            <a:schemeClr val="phClr"/>
-          </a:solidFill>
-          <a:prstDash val="solid"/>
-        </a:ln>
-      </a:lnStyleLst>
-      <a:effectStyleLst>
-        <a:effectStyle>
-          <a:effectLst>
-            <a:outerShdw blurRad="40000" dist="20000" dir="5400000" rotWithShape="0">
-              <a:srgbClr val="000000">
-                <a:alpha val="38000"/>
-              </a:srgbClr>
-            </a:outerShdw>
-          </a:effectLst>
-        </a:effectStyle>
-        <a:effectStyle>
-          <a:effectLst>
-            <a:outerShdw blurRad="40000" dist="23000" dir="5400000" rotWithShape="0">
-              <a:srgbClr val="000000">
-                <a:alpha val="35000"/>
-              </a:srgbClr>
-            </a:outerShdw>
-          </a:effectLst>
-        </a:effectStyle>
-        <a:effectStyle>
-          <a:effectLst>
-            <a:outerShdw blurRad="40000" dist="23000" dir="5400000" rotWithShape="0">
-              <a:srgbClr val="000000">
-                <a:alpha val="35000"/>
-              </a:srgbClr>
-            </a:outerShdw>
-          </a:effectLst>
-          <a:scene3d>
-            <a:camera prst="orthographicFront">
-              <a:rot lat="0" lon="0" rev="0"/>
-            </a:camera>
-            <a:lightRig rig="threePt" dir="t">
-              <a:rot lat="0" lon="0" rev="1200000"/>
-            </a:lightRig>
-          </a:scene3d>
-          <a:sp3d>
-            <a:bevelT w="63500" h="25400"/>
-          </a:sp3d>
-        </a:effectStyle>
-      </a:effectStyleLst>
-      <a:bgFillStyleLst>
-        <a:solidFill>
-          <a:schemeClr val="phClr"/>
-        </a:solidFill>
-        <a:gradFill rotWithShape="1">
-          <a:gsLst>
-            <a:gs pos="0">
-              <a:schemeClr val="phClr">
-                <a:tint val="40000"/>
-                <a:satMod val="350000"/>
-              </a:schemeClr>
-            </a:gs>
-            <a:gs pos="40000">
-              <a:schemeClr val="phClr">
-                <a:tint val="45000"/>
-                <a:shade val="99000"/>
-                <a:satMod val="350000"/>
-              </a:schemeClr>
-            </a:gs>
-            <a:gs pos="100000">
-              <a:schemeClr val="phClr">
-                <a:shade val="20000"/>
-                <a:satMod val="255000"/>
-              </a:schemeClr>
-            </a:gs>
-          </a:gsLst>
-          <a:path path="circle">
-            <a:fillToRect l="50000" t="-80000" r="50000" b="180000"/>
-          </a:path>
-        </a:gradFill>
-        <a:gradFill rotWithShape="1">
-          <a:gsLst>
-            <a:gs pos="0">
-              <a:schemeClr val="phClr">
-                <a:tint val="80000"/>
-                <a:satMod val="300000"/>
-              </a:schemeClr>
-            </a:gs>
-            <a:gs pos="100000">
-              <a:schemeClr val="phClr">
-                <a:shade val="30000"/>
-                <a:satMod val="200000"/>
-              </a:schemeClr>
-            </a:gs>
-          </a:gsLst>
-          <a:path path="circle">
-            <a:fillToRect l="50000" t="50000" r="50000" b="50000"/>
-          </a:path>
-        </a:gradFill>
-      </a:bgFillStyleLst>
-    </a:fmtScheme>
-  </a:themeElements>
-</a:theme>
 </file>
</xml_diff>